<commit_message>
ppt + klaszter jav
</commit_message>
<xml_diff>
--- a/Prezi.pptx
+++ b/Prezi.pptx
@@ -6158,6 +6158,10 @@
               <a:rPr lang="hu-HU" dirty="0"/>
               <a:t> λ:</a:t>
             </a:r>
+            <a:r>
+              <a:rPr lang="en-US" dirty="0"/>
+              <a:t> </a:t>
+            </a:r>
           </a:p>
           <a:p>
             <a:pPr lvl="1"/>
@@ -6165,7 +6169,10 @@
               <a:rPr lang="hu-HU" dirty="0"/>
               <a:t>Értéke: </a:t>
             </a:r>
-            <a:endParaRPr lang="en-US" dirty="0"/>
+            <a:r>
+              <a:rPr lang="en-US" dirty="0"/>
+              <a:t>-2,82</a:t>
+            </a:r>
           </a:p>
           <a:p>
             <a:pPr lvl="1"/>
@@ -6173,6 +6180,15 @@
               <a:rPr lang="hu-HU" dirty="0"/>
               <a:t>Az így kapott változók száma: </a:t>
             </a:r>
+            <a:r>
+              <a:rPr lang="en-US" dirty="0"/>
+              <a:t>13 </a:t>
+            </a:r>
+            <a:r>
+              <a:rPr lang="en-US" dirty="0" err="1"/>
+              <a:t>db</a:t>
+            </a:r>
+            <a:endParaRPr lang="hu-HU" dirty="0"/>
           </a:p>
         </p:txBody>
       </p:sp>
@@ -6966,7 +6982,19 @@
           <a:p>
             <a:r>
               <a:rPr lang="hu-HU" dirty="0"/>
-              <a:t>Fontosabb változók:</a:t>
+              <a:t>Fontosabb</a:t>
+            </a:r>
+            <a:r>
+              <a:rPr lang="en-US" dirty="0"/>
+              <a:t>nak </a:t>
+            </a:r>
+            <a:r>
+              <a:rPr lang="en-US" dirty="0" err="1"/>
+              <a:t>tartott</a:t>
+            </a:r>
+            <a:r>
+              <a:rPr lang="hu-HU" dirty="0"/>
+              <a:t> változók:</a:t>
             </a:r>
           </a:p>
           <a:p>
@@ -6987,13 +7015,6 @@
             <a:pPr lvl="1"/>
             <a:r>
               <a:rPr lang="hu-HU" dirty="0"/>
-              <a:t>Szobák száma</a:t>
-            </a:r>
-          </a:p>
-          <a:p>
-            <a:pPr lvl="1"/>
-            <a:r>
-              <a:rPr lang="hu-HU" dirty="0"/>
               <a:t>Építés éve</a:t>
             </a:r>
           </a:p>
@@ -7002,6 +7023,18 @@
             <a:r>
               <a:rPr lang="hu-HU" dirty="0"/>
               <a:t>Garázsba beférő autók száma</a:t>
+            </a:r>
+            <a:endParaRPr lang="en-US" dirty="0"/>
+          </a:p>
+          <a:p>
+            <a:pPr lvl="1"/>
+            <a:r>
+              <a:rPr lang="hu-HU"/>
+              <a:t>Legutóbbi </a:t>
+            </a:r>
+            <a:r>
+              <a:rPr lang="hu-HU" dirty="0"/>
+              <a:t>felújítás éve</a:t>
             </a:r>
           </a:p>
         </p:txBody>

</xml_diff>

<commit_message>
klaszter, pca, prezi frissítés
</commit_message>
<xml_diff>
--- a/Prezi.pptx
+++ b/Prezi.pptx
@@ -17,6 +17,7 @@
     <p:sldId id="263" r:id="rId11"/>
     <p:sldId id="265" r:id="rId12"/>
     <p:sldId id="266" r:id="rId13"/>
+    <p:sldId id="268" r:id="rId14"/>
   </p:sldIdLst>
   <p:sldSz cx="12192000" cy="6858000"/>
   <p:notesSz cx="6858000" cy="9144000"/>
@@ -293,7 +294,7 @@
           <a:p>
             <a:fld id="{DDC88B96-5AA7-4CB3-87A1-08842D85DC16}" type="datetimeFigureOut">
               <a:rPr lang="hu-HU" smtClean="0"/>
-              <a:t>2023. 12. 01.</a:t>
+              <a:t>2023. 12. 03.</a:t>
             </a:fld>
             <a:endParaRPr lang="hu-HU"/>
           </a:p>
@@ -560,7 +561,7 @@
           <a:p>
             <a:fld id="{DDC88B96-5AA7-4CB3-87A1-08842D85DC16}" type="datetimeFigureOut">
               <a:rPr lang="hu-HU" smtClean="0"/>
-              <a:t>2023. 12. 01.</a:t>
+              <a:t>2023. 12. 03.</a:t>
             </a:fld>
             <a:endParaRPr lang="hu-HU"/>
           </a:p>
@@ -791,7 +792,7 @@
           <a:p>
             <a:fld id="{DDC88B96-5AA7-4CB3-87A1-08842D85DC16}" type="datetimeFigureOut">
               <a:rPr lang="hu-HU" smtClean="0"/>
-              <a:t>2023. 12. 01.</a:t>
+              <a:t>2023. 12. 03.</a:t>
             </a:fld>
             <a:endParaRPr lang="hu-HU"/>
           </a:p>
@@ -1101,7 +1102,7 @@
           <a:p>
             <a:fld id="{DDC88B96-5AA7-4CB3-87A1-08842D85DC16}" type="datetimeFigureOut">
               <a:rPr lang="hu-HU" smtClean="0"/>
-              <a:t>2023. 12. 01.</a:t>
+              <a:t>2023. 12. 03.</a:t>
             </a:fld>
             <a:endParaRPr lang="hu-HU"/>
           </a:p>
@@ -1574,7 +1575,7 @@
           <a:p>
             <a:fld id="{DDC88B96-5AA7-4CB3-87A1-08842D85DC16}" type="datetimeFigureOut">
               <a:rPr lang="hu-HU" smtClean="0"/>
-              <a:t>2023. 12. 01.</a:t>
+              <a:t>2023. 12. 03.</a:t>
             </a:fld>
             <a:endParaRPr lang="hu-HU"/>
           </a:p>
@@ -2121,7 +2122,7 @@
           <a:p>
             <a:fld id="{DDC88B96-5AA7-4CB3-87A1-08842D85DC16}" type="datetimeFigureOut">
               <a:rPr lang="hu-HU" smtClean="0"/>
-              <a:t>2023. 12. 01.</a:t>
+              <a:t>2023. 12. 03.</a:t>
             </a:fld>
             <a:endParaRPr lang="hu-HU"/>
           </a:p>
@@ -2895,7 +2896,7 @@
           <a:p>
             <a:fld id="{DDC88B96-5AA7-4CB3-87A1-08842D85DC16}" type="datetimeFigureOut">
               <a:rPr lang="hu-HU" smtClean="0"/>
-              <a:t>2023. 12. 01.</a:t>
+              <a:t>2023. 12. 03.</a:t>
             </a:fld>
             <a:endParaRPr lang="hu-HU"/>
           </a:p>
@@ -3070,7 +3071,7 @@
           <a:p>
             <a:fld id="{DDC88B96-5AA7-4CB3-87A1-08842D85DC16}" type="datetimeFigureOut">
               <a:rPr lang="hu-HU" smtClean="0"/>
-              <a:t>2023. 12. 01.</a:t>
+              <a:t>2023. 12. 03.</a:t>
             </a:fld>
             <a:endParaRPr lang="hu-HU"/>
           </a:p>
@@ -3293,7 +3294,7 @@
           <a:p>
             <a:fld id="{DDC88B96-5AA7-4CB3-87A1-08842D85DC16}" type="datetimeFigureOut">
               <a:rPr lang="hu-HU" smtClean="0"/>
-              <a:t>2023. 12. 01.</a:t>
+              <a:t>2023. 12. 03.</a:t>
             </a:fld>
             <a:endParaRPr lang="hu-HU"/>
           </a:p>
@@ -3473,7 +3474,7 @@
           <a:p>
             <a:fld id="{DDC88B96-5AA7-4CB3-87A1-08842D85DC16}" type="datetimeFigureOut">
               <a:rPr lang="hu-HU" smtClean="0"/>
-              <a:t>2023. 12. 01.</a:t>
+              <a:t>2023. 12. 03.</a:t>
             </a:fld>
             <a:endParaRPr lang="hu-HU"/>
           </a:p>
@@ -3762,7 +3763,7 @@
           <a:p>
             <a:fld id="{DDC88B96-5AA7-4CB3-87A1-08842D85DC16}" type="datetimeFigureOut">
               <a:rPr lang="hu-HU" smtClean="0"/>
-              <a:t>2023. 12. 01.</a:t>
+              <a:t>2023. 12. 03.</a:t>
             </a:fld>
             <a:endParaRPr lang="hu-HU"/>
           </a:p>
@@ -4004,7 +4005,7 @@
           <a:p>
             <a:fld id="{DDC88B96-5AA7-4CB3-87A1-08842D85DC16}" type="datetimeFigureOut">
               <a:rPr lang="hu-HU" smtClean="0"/>
-              <a:t>2023. 12. 01.</a:t>
+              <a:t>2023. 12. 03.</a:t>
             </a:fld>
             <a:endParaRPr lang="hu-HU"/>
           </a:p>
@@ -4383,7 +4384,7 @@
           <a:p>
             <a:fld id="{DDC88B96-5AA7-4CB3-87A1-08842D85DC16}" type="datetimeFigureOut">
               <a:rPr lang="hu-HU" smtClean="0"/>
-              <a:t>2023. 12. 01.</a:t>
+              <a:t>2023. 12. 03.</a:t>
             </a:fld>
             <a:endParaRPr lang="hu-HU"/>
           </a:p>
@@ -4501,7 +4502,7 @@
           <a:p>
             <a:fld id="{DDC88B96-5AA7-4CB3-87A1-08842D85DC16}" type="datetimeFigureOut">
               <a:rPr lang="hu-HU" smtClean="0"/>
-              <a:t>2023. 12. 01.</a:t>
+              <a:t>2023. 12. 03.</a:t>
             </a:fld>
             <a:endParaRPr lang="hu-HU"/>
           </a:p>
@@ -4596,7 +4597,7 @@
           <a:p>
             <a:fld id="{DDC88B96-5AA7-4CB3-87A1-08842D85DC16}" type="datetimeFigureOut">
               <a:rPr lang="hu-HU" smtClean="0"/>
-              <a:t>2023. 12. 01.</a:t>
+              <a:t>2023. 12. 03.</a:t>
             </a:fld>
             <a:endParaRPr lang="hu-HU"/>
           </a:p>
@@ -4845,7 +4846,7 @@
           <a:p>
             <a:fld id="{DDC88B96-5AA7-4CB3-87A1-08842D85DC16}" type="datetimeFigureOut">
               <a:rPr lang="hu-HU" smtClean="0"/>
-              <a:t>2023. 12. 01.</a:t>
+              <a:t>2023. 12. 03.</a:t>
             </a:fld>
             <a:endParaRPr lang="hu-HU"/>
           </a:p>
@@ -5102,7 +5103,7 @@
           <a:p>
             <a:fld id="{DDC88B96-5AA7-4CB3-87A1-08842D85DC16}" type="datetimeFigureOut">
               <a:rPr lang="hu-HU" smtClean="0"/>
-              <a:t>2023. 12. 01.</a:t>
+              <a:t>2023. 12. 03.</a:t>
             </a:fld>
             <a:endParaRPr lang="hu-HU"/>
           </a:p>
@@ -5345,7 +5346,7 @@
           <a:p>
             <a:fld id="{DDC88B96-5AA7-4CB3-87A1-08842D85DC16}" type="datetimeFigureOut">
               <a:rPr lang="hu-HU" smtClean="0"/>
-              <a:t>2023. 12. 01.</a:t>
+              <a:t>2023. 12. 03.</a:t>
             </a:fld>
             <a:endParaRPr lang="hu-HU"/>
           </a:p>
@@ -6725,6 +6726,70 @@
 </p:sld>
 </file>
 
+<file path=ppt/slides/slide13.xml><?xml version="1.0" encoding="utf-8"?>
+<p:sld xmlns:a="http://schemas.openxmlformats.org/drawingml/2006/main" xmlns:r="http://schemas.openxmlformats.org/officeDocument/2006/relationships" xmlns:p="http://schemas.openxmlformats.org/presentationml/2006/main">
+  <p:cSld>
+    <p:spTree>
+      <p:nvGrpSpPr>
+        <p:cNvPr id="1" name=""/>
+        <p:cNvGrpSpPr/>
+        <p:nvPr/>
+      </p:nvGrpSpPr>
+      <p:grpSpPr>
+        <a:xfrm>
+          <a:off x="0" y="0"/>
+          <a:ext cx="0" cy="0"/>
+          <a:chOff x="0" y="0"/>
+          <a:chExt cx="0" cy="0"/>
+        </a:xfrm>
+      </p:grpSpPr>
+      <p:sp>
+        <p:nvSpPr>
+          <p:cNvPr id="2" name="Cím 1">
+            <a:extLst>
+              <a:ext uri="{FF2B5EF4-FFF2-40B4-BE49-F238E27FC236}">
+                <a16:creationId xmlns:a16="http://schemas.microsoft.com/office/drawing/2014/main" id="{BA1268D0-64F2-8913-D0DE-1F1812331BB5}"/>
+              </a:ext>
+            </a:extLst>
+          </p:cNvPr>
+          <p:cNvSpPr>
+            <a:spLocks noGrp="1"/>
+          </p:cNvSpPr>
+          <p:nvPr>
+            <p:ph type="title"/>
+          </p:nvPr>
+        </p:nvSpPr>
+        <p:spPr>
+          <a:xfrm>
+            <a:off x="1790700" y="2781300"/>
+            <a:ext cx="8610600" cy="1295400"/>
+          </a:xfrm>
+        </p:spPr>
+        <p:txBody>
+          <a:bodyPr/>
+          <a:lstStyle/>
+          <a:p>
+            <a:pPr algn="ctr"/>
+            <a:r>
+              <a:rPr lang="hu-HU" dirty="0"/>
+              <a:t>Köszönjük a figyelmet!</a:t>
+            </a:r>
+          </a:p>
+        </p:txBody>
+      </p:sp>
+    </p:spTree>
+    <p:extLst>
+      <p:ext uri="{BB962C8B-B14F-4D97-AF65-F5344CB8AC3E}">
+        <p14:creationId xmlns:p14="http://schemas.microsoft.com/office/powerpoint/2010/main" val="3573617845"/>
+      </p:ext>
+    </p:extLst>
+  </p:cSld>
+  <p:clrMapOvr>
+    <a:masterClrMapping/>
+  </p:clrMapOvr>
+</p:sld>
+</file>
+
 <file path=ppt/slides/slide2.xml><?xml version="1.0" encoding="utf-8"?>
 <p:sld xmlns:a="http://schemas.openxmlformats.org/drawingml/2006/main" xmlns:r="http://schemas.openxmlformats.org/officeDocument/2006/relationships" xmlns:p="http://schemas.openxmlformats.org/presentationml/2006/main">
   <p:cSld>
@@ -7714,7 +7779,7 @@
           <a:p>
             <a:pPr algn="l"/>
             <a:r>
-              <a:rPr lang="en-US" sz="3200" kern="1200" cap="all" baseline="0">
+              <a:rPr lang="en-US" sz="3200" kern="1200" cap="all" baseline="0" dirty="0" err="1">
                 <a:solidFill>
                   <a:schemeClr val="tx1"/>
                 </a:solidFill>
@@ -7722,8 +7787,16 @@
                 <a:ea typeface="+mj-ea"/>
                 <a:cs typeface="+mj-cs"/>
               </a:rPr>
-              <a:t>klaszterelemzés</a:t>
-            </a:r>
+              <a:t>Klaszterelemzés</a:t>
+            </a:r>
+            <a:endParaRPr lang="en-US" sz="3200" kern="1200" cap="all" baseline="0" dirty="0">
+              <a:solidFill>
+                <a:schemeClr val="tx1"/>
+              </a:solidFill>
+              <a:latin typeface="+mj-lt"/>
+              <a:ea typeface="+mj-ea"/>
+              <a:cs typeface="+mj-cs"/>
+            </a:endParaRPr>
           </a:p>
         </p:txBody>
       </p:sp>
@@ -7745,7 +7818,7 @@
         </p:nvSpPr>
         <p:spPr>
           <a:xfrm>
-            <a:off x="685800" y="2364573"/>
+            <a:off x="685799" y="2666973"/>
             <a:ext cx="3977639" cy="3854112"/>
           </a:xfrm>
         </p:spPr>
@@ -7756,36 +7829,178 @@
           <a:lstStyle/>
           <a:p>
             <a:r>
-              <a:rPr lang="en-US" sz="1600"/>
-              <a:t>Célja: Csoportokra bontsuk az ingatlanokat hasonló jellemzők alapján</a:t>
-            </a:r>
-          </a:p>
-          <a:p>
-            <a:endParaRPr lang="en-US" sz="1600"/>
-          </a:p>
-          <a:p>
-            <a:r>
-              <a:rPr lang="en-US" sz="1600"/>
-              <a:t>Könnyebben lehet prediktív modelleket építeni az árakra a hasonló tulajdonságok miatt</a:t>
-            </a:r>
+              <a:rPr lang="en-US" sz="1600" dirty="0" err="1"/>
+              <a:t>Célja</a:t>
+            </a:r>
+            <a:r>
+              <a:rPr lang="en-US" sz="1600" dirty="0"/>
+              <a:t>: </a:t>
+            </a:r>
+            <a:r>
+              <a:rPr lang="en-US" sz="1600" dirty="0" err="1"/>
+              <a:t>Csoportokra</a:t>
+            </a:r>
+            <a:r>
+              <a:rPr lang="en-US" sz="1600" dirty="0"/>
+              <a:t> </a:t>
+            </a:r>
+            <a:r>
+              <a:rPr lang="en-US" sz="1600" dirty="0" err="1"/>
+              <a:t>bontsuk</a:t>
+            </a:r>
+            <a:r>
+              <a:rPr lang="en-US" sz="1600" dirty="0"/>
+              <a:t> </a:t>
+            </a:r>
+            <a:r>
+              <a:rPr lang="en-US" sz="1600" dirty="0" err="1"/>
+              <a:t>az</a:t>
+            </a:r>
+            <a:r>
+              <a:rPr lang="en-US" sz="1600" dirty="0"/>
+              <a:t> </a:t>
+            </a:r>
+            <a:r>
+              <a:rPr lang="en-US" sz="1600" dirty="0" err="1"/>
+              <a:t>ingatlanokat</a:t>
+            </a:r>
+            <a:r>
+              <a:rPr lang="en-US" sz="1600" dirty="0"/>
+              <a:t> </a:t>
+            </a:r>
+            <a:r>
+              <a:rPr lang="en-US" sz="1600" dirty="0" err="1"/>
+              <a:t>hasonló</a:t>
+            </a:r>
+            <a:r>
+              <a:rPr lang="en-US" sz="1600" dirty="0"/>
+              <a:t> </a:t>
+            </a:r>
+            <a:r>
+              <a:rPr lang="en-US" sz="1600" dirty="0" err="1"/>
+              <a:t>jellemzők</a:t>
+            </a:r>
+            <a:r>
+              <a:rPr lang="en-US" sz="1600" dirty="0"/>
+              <a:t> </a:t>
+            </a:r>
+            <a:r>
+              <a:rPr lang="en-US" sz="1600" dirty="0" err="1"/>
+              <a:t>alapján</a:t>
+            </a:r>
+            <a:endParaRPr lang="en-US" sz="1600" dirty="0"/>
+          </a:p>
+          <a:p>
+            <a:endParaRPr lang="en-US" sz="1600" dirty="0"/>
+          </a:p>
+          <a:p>
+            <a:r>
+              <a:rPr lang="en-US" sz="1600" dirty="0" err="1"/>
+              <a:t>Könnyebben</a:t>
+            </a:r>
+            <a:r>
+              <a:rPr lang="en-US" sz="1600" dirty="0"/>
+              <a:t> </a:t>
+            </a:r>
+            <a:r>
+              <a:rPr lang="en-US" sz="1600" dirty="0" err="1"/>
+              <a:t>lehet</a:t>
+            </a:r>
+            <a:r>
+              <a:rPr lang="en-US" sz="1600" dirty="0"/>
+              <a:t> </a:t>
+            </a:r>
+            <a:r>
+              <a:rPr lang="en-US" sz="1600" dirty="0" err="1"/>
+              <a:t>prediktív</a:t>
+            </a:r>
+            <a:r>
+              <a:rPr lang="en-US" sz="1600" dirty="0"/>
+              <a:t> </a:t>
+            </a:r>
+            <a:r>
+              <a:rPr lang="en-US" sz="1600" dirty="0" err="1"/>
+              <a:t>modelleket</a:t>
+            </a:r>
+            <a:r>
+              <a:rPr lang="en-US" sz="1600" dirty="0"/>
+              <a:t> </a:t>
+            </a:r>
+            <a:r>
+              <a:rPr lang="en-US" sz="1600" dirty="0" err="1"/>
+              <a:t>építeni</a:t>
+            </a:r>
+            <a:r>
+              <a:rPr lang="en-US" sz="1600" dirty="0"/>
+              <a:t> </a:t>
+            </a:r>
+            <a:r>
+              <a:rPr lang="en-US" sz="1600" dirty="0" err="1"/>
+              <a:t>az</a:t>
+            </a:r>
+            <a:r>
+              <a:rPr lang="en-US" sz="1600" dirty="0"/>
+              <a:t> </a:t>
+            </a:r>
+            <a:r>
+              <a:rPr lang="en-US" sz="1600" dirty="0" err="1"/>
+              <a:t>árakra</a:t>
+            </a:r>
+            <a:r>
+              <a:rPr lang="en-US" sz="1600" dirty="0"/>
+              <a:t> a </a:t>
+            </a:r>
+            <a:r>
+              <a:rPr lang="en-US" sz="1600" dirty="0" err="1"/>
+              <a:t>hasonló</a:t>
+            </a:r>
+            <a:r>
+              <a:rPr lang="en-US" sz="1600" dirty="0"/>
+              <a:t> </a:t>
+            </a:r>
+            <a:r>
+              <a:rPr lang="en-US" sz="1600" dirty="0" err="1"/>
+              <a:t>tulajdonságok</a:t>
+            </a:r>
+            <a:r>
+              <a:rPr lang="en-US" sz="1600" dirty="0"/>
+              <a:t> </a:t>
+            </a:r>
+            <a:r>
+              <a:rPr lang="en-US" sz="1600" dirty="0" err="1"/>
+              <a:t>miatt</a:t>
+            </a:r>
+            <a:endParaRPr lang="hu-HU" sz="1600" dirty="0"/>
+          </a:p>
+          <a:p>
+            <a:endParaRPr lang="hu-HU" sz="1600" dirty="0"/>
+          </a:p>
+          <a:p>
+            <a:r>
+              <a:rPr lang="hu-HU" sz="1600" dirty="0" err="1"/>
+              <a:t>Gap</a:t>
+            </a:r>
+            <a:r>
+              <a:rPr lang="hu-HU" sz="1600" dirty="0"/>
+              <a:t>-statisztika: legjobb k-érték meghatározása</a:t>
+            </a:r>
+            <a:endParaRPr lang="en-US" sz="1600" dirty="0"/>
           </a:p>
         </p:txBody>
       </p:sp>
       <p:pic>
         <p:nvPicPr>
-          <p:cNvPr id="5" name="Tartalom helye 4">
+          <p:cNvPr id="7" name="Kép 6">
             <a:extLst>
               <a:ext uri="{FF2B5EF4-FFF2-40B4-BE49-F238E27FC236}">
-                <a16:creationId xmlns:a16="http://schemas.microsoft.com/office/drawing/2014/main" id="{905456D0-5912-A5EE-D60C-6DEB399BE2FC}"/>
+                <a16:creationId xmlns:a16="http://schemas.microsoft.com/office/drawing/2014/main" id="{74FC8871-454B-B6B6-2BBA-493E6964D252}"/>
               </a:ext>
             </a:extLst>
           </p:cNvPr>
           <p:cNvPicPr>
-            <a:picLocks noGrp="1" noChangeAspect="1"/>
+            <a:picLocks noChangeAspect="1"/>
           </p:cNvPicPr>
-          <p:nvPr>
-            <p:ph sz="half" idx="2"/>
-          </p:nvPr>
+          <p:nvPr/>
         </p:nvPicPr>
         <p:blipFill>
           <a:blip r:embed="rId2"/>
@@ -7795,8 +8010,8 @@
         </p:blipFill>
         <p:spPr>
           <a:xfrm>
-            <a:off x="4972699" y="1146679"/>
-            <a:ext cx="6533501" cy="4671452"/>
+            <a:off x="5402760" y="1564473"/>
+            <a:ext cx="6103440" cy="4359600"/>
           </a:xfrm>
           <a:prstGeom prst="rect">
             <a:avLst/>
@@ -7841,6 +8056,51 @@
           <a:chExt cx="0" cy="0"/>
         </a:xfrm>
       </p:grpSpPr>
+      <p:pic>
+        <p:nvPicPr>
+          <p:cNvPr id="24" name="Picture 20">
+            <a:extLst>
+              <a:ext uri="{FF2B5EF4-FFF2-40B4-BE49-F238E27FC236}">
+                <a16:creationId xmlns:a16="http://schemas.microsoft.com/office/drawing/2014/main" id="{EC3BBC63-DC19-41B8-AB81-E30CC21AEB8B}"/>
+              </a:ext>
+              <a:ext uri="{C183D7F6-B498-43B3-948B-1728B52AA6E4}">
+                <adec:decorative xmlns:adec="http://schemas.microsoft.com/office/drawing/2017/decorative" val="1"/>
+              </a:ext>
+            </a:extLst>
+          </p:cNvPr>
+          <p:cNvPicPr>
+            <a:picLocks noGrp="1" noRot="1" noChangeAspect="1" noMove="1" noResize="1" noEditPoints="1" noAdjustHandles="1" noChangeArrowheads="1" noChangeShapeType="1" noCrop="1"/>
+          </p:cNvPicPr>
+          <p:nvPr>
+            <p:extLst>
+              <p:ext uri="{386F3935-93C4-4BCD-93E2-E3B085C9AB24}">
+                <p16:designElem xmlns:p16="http://schemas.microsoft.com/office/powerpoint/2015/main" val="1"/>
+              </p:ext>
+            </p:extLst>
+          </p:nvPr>
+        </p:nvPicPr>
+        <p:blipFill>
+          <a:blip r:embed="rId2">
+            <a:extLst>
+              <a:ext uri="{28A0092B-C50C-407E-A947-70E740481C1C}">
+                <a14:useLocalDpi xmlns:a14="http://schemas.microsoft.com/office/drawing/2010/main" val="0"/>
+              </a:ext>
+            </a:extLst>
+          </a:blip>
+          <a:stretch>
+            <a:fillRect/>
+          </a:stretch>
+        </p:blipFill>
+        <p:spPr>
+          <a:xfrm>
+            <a:off x="0" y="0"/>
+            <a:ext cx="12192000" cy="1441450"/>
+          </a:xfrm>
+          <a:prstGeom prst="rect">
+            <a:avLst/>
+          </a:prstGeom>
+        </p:spPr>
+      </p:pic>
       <p:sp>
         <p:nvSpPr>
           <p:cNvPr id="2" name="Cím 1">
@@ -7859,8 +8119,8 @@
         </p:nvSpPr>
         <p:spPr>
           <a:xfrm>
-            <a:off x="619760" y="764373"/>
-            <a:ext cx="6832600" cy="1293028"/>
+            <a:off x="2895600" y="764373"/>
+            <a:ext cx="8610600" cy="1293028"/>
           </a:xfrm>
         </p:spPr>
         <p:txBody>
@@ -7894,8 +8154,8 @@
         </p:nvSpPr>
         <p:spPr>
           <a:xfrm>
-            <a:off x="619760" y="2194560"/>
-            <a:ext cx="6832600" cy="4024125"/>
+            <a:off x="685800" y="2194560"/>
+            <a:ext cx="6071461" cy="4024125"/>
           </a:xfrm>
         </p:spPr>
         <p:txBody>
@@ -7904,16 +8164,46 @@
           </a:bodyPr>
           <a:lstStyle/>
           <a:p>
+            <a:pPr marL="0" indent="0">
+              <a:buNone/>
+            </a:pPr>
+            <a:endParaRPr lang="hu-HU" dirty="0"/>
+          </a:p>
+          <a:p>
+            <a:r>
+              <a:rPr lang="hu-HU" dirty="0"/>
+              <a:t>Klaszterek jobb elkülönítése</a:t>
+            </a:r>
+          </a:p>
+          <a:p>
+            <a:endParaRPr lang="hu-HU" dirty="0"/>
+          </a:p>
+          <a:p>
+            <a:r>
+              <a:rPr lang="hu-HU" dirty="0"/>
+              <a:t>Dimenziócsökkentés</a:t>
+            </a:r>
+          </a:p>
+          <a:p>
+            <a:endParaRPr lang="hu-HU" dirty="0"/>
+          </a:p>
+          <a:p>
+            <a:r>
+              <a:rPr lang="hu-HU" dirty="0"/>
+              <a:t>Jellemzők súlyozása</a:t>
+            </a:r>
+          </a:p>
+          <a:p>
             <a:endParaRPr lang="en-US" dirty="0"/>
           </a:p>
         </p:txBody>
       </p:sp>
       <p:pic>
         <p:nvPicPr>
-          <p:cNvPr id="5" name="Tartalom helye 4">
+          <p:cNvPr id="7" name="Tartalom helye 6">
             <a:extLst>
               <a:ext uri="{FF2B5EF4-FFF2-40B4-BE49-F238E27FC236}">
-                <a16:creationId xmlns:a16="http://schemas.microsoft.com/office/drawing/2014/main" id="{1F912345-1492-815C-45D2-00BF3AB5D8C8}"/>
+                <a16:creationId xmlns:a16="http://schemas.microsoft.com/office/drawing/2014/main" id="{417A1EDB-75E4-0671-069A-CCB17EDCC1E6}"/>
               </a:ext>
             </a:extLst>
           </p:cNvPr>
@@ -7924,43 +8214,16 @@
             <p:ph sz="half" idx="2"/>
           </p:nvPr>
         </p:nvPicPr>
-        <p:blipFill rotWithShape="1">
-          <a:blip r:embed="rId2"/>
-          <a:stretch/>
+        <p:blipFill>
+          <a:blip r:embed="rId3"/>
+          <a:stretch>
+            <a:fillRect/>
+          </a:stretch>
         </p:blipFill>
         <p:spPr>
           <a:xfrm>
             <a:off x="6172200" y="2301081"/>
             <a:ext cx="5334000" cy="3810000"/>
-          </a:xfrm>
-          <a:prstGeom prst="rect">
-            <a:avLst/>
-          </a:prstGeom>
-        </p:spPr>
-      </p:pic>
-      <p:pic>
-        <p:nvPicPr>
-          <p:cNvPr id="6" name="Tartalom helye 5">
-            <a:extLst>
-              <a:ext uri="{FF2B5EF4-FFF2-40B4-BE49-F238E27FC236}">
-                <a16:creationId xmlns:a16="http://schemas.microsoft.com/office/drawing/2014/main" id="{0AB00A5F-5C14-084A-64C3-3BCB0DFE7324}"/>
-              </a:ext>
-            </a:extLst>
-          </p:cNvPr>
-          <p:cNvPicPr>
-            <a:picLocks noChangeAspect="1"/>
-          </p:cNvPicPr>
-          <p:nvPr/>
-        </p:nvPicPr>
-        <p:blipFill rotWithShape="1">
-          <a:blip r:embed="rId3"/>
-          <a:srcRect r="-4" b="8772"/>
-          <a:stretch/>
-        </p:blipFill>
-        <p:spPr>
-          <a:xfrm>
-            <a:off x="7861238" y="933693"/>
-            <a:ext cx="3644962" cy="2377440"/>
           </a:xfrm>
           <a:prstGeom prst="rect">
             <a:avLst/>

</xml_diff>